<commit_message>
Fixed spelling errors in presentation
</commit_message>
<xml_diff>
--- a/FlaskLogin/FlaskLogin.pptx
+++ b/FlaskLogin/FlaskLogin.pptx
@@ -180,7 +180,7 @@
   <pc:docChgLst>
     <pc:chgData name="Weges, Wouter" userId="3777fe71-dce6-4e56-b802-8222ee201179" providerId="ADAL" clId="{2FDFBEF1-062A-4120-8290-D6C290D02C2A}"/>
     <pc:docChg chg="undo redo custSel addSld delSld modSld sldOrd modSection">
-      <pc:chgData name="Weges, Wouter" userId="3777fe71-dce6-4e56-b802-8222ee201179" providerId="ADAL" clId="{2FDFBEF1-062A-4120-8290-D6C290D02C2A}" dt="2024-06-03T10:22:43.846" v="3377" actId="115"/>
+      <pc:chgData name="Weges, Wouter" userId="3777fe71-dce6-4e56-b802-8222ee201179" providerId="ADAL" clId="{2FDFBEF1-062A-4120-8290-D6C290D02C2A}" dt="2024-06-04T08:27:29.215" v="3409" actId="20577"/>
       <pc:docMkLst>
         <pc:docMk/>
       </pc:docMkLst>
@@ -242,7 +242,7 @@
         </pc:sldMkLst>
       </pc:sldChg>
       <pc:sldChg chg="addSp modSp mod">
-        <pc:chgData name="Weges, Wouter" userId="3777fe71-dce6-4e56-b802-8222ee201179" providerId="ADAL" clId="{2FDFBEF1-062A-4120-8290-D6C290D02C2A}" dt="2024-06-03T09:38:06.581" v="654" actId="20577"/>
+        <pc:chgData name="Weges, Wouter" userId="3777fe71-dce6-4e56-b802-8222ee201179" providerId="ADAL" clId="{2FDFBEF1-062A-4120-8290-D6C290D02C2A}" dt="2024-06-04T08:25:14.933" v="3378" actId="20577"/>
         <pc:sldMkLst>
           <pc:docMk/>
           <pc:sldMk cId="3652992737" sldId="277"/>
@@ -256,7 +256,7 @@
           </ac:spMkLst>
         </pc:spChg>
         <pc:spChg chg="mod">
-          <ac:chgData name="Weges, Wouter" userId="3777fe71-dce6-4e56-b802-8222ee201179" providerId="ADAL" clId="{2FDFBEF1-062A-4120-8290-D6C290D02C2A}" dt="2024-06-03T09:38:06.581" v="654" actId="20577"/>
+          <ac:chgData name="Weges, Wouter" userId="3777fe71-dce6-4e56-b802-8222ee201179" providerId="ADAL" clId="{2FDFBEF1-062A-4120-8290-D6C290D02C2A}" dt="2024-06-04T08:25:14.933" v="3378" actId="20577"/>
           <ac:spMkLst>
             <pc:docMk/>
             <pc:sldMk cId="3652992737" sldId="277"/>
@@ -688,13 +688,13 @@
         </pc:picChg>
       </pc:sldChg>
       <pc:sldChg chg="addSp delSp modSp add mod">
-        <pc:chgData name="Weges, Wouter" userId="3777fe71-dce6-4e56-b802-8222ee201179" providerId="ADAL" clId="{2FDFBEF1-062A-4120-8290-D6C290D02C2A}" dt="2024-06-03T10:03:12.556" v="1866" actId="1076"/>
+        <pc:chgData name="Weges, Wouter" userId="3777fe71-dce6-4e56-b802-8222ee201179" providerId="ADAL" clId="{2FDFBEF1-062A-4120-8290-D6C290D02C2A}" dt="2024-06-04T08:26:34.395" v="3400" actId="20577"/>
         <pc:sldMkLst>
           <pc:docMk/>
           <pc:sldMk cId="4110594355" sldId="295"/>
         </pc:sldMkLst>
         <pc:spChg chg="mod">
-          <ac:chgData name="Weges, Wouter" userId="3777fe71-dce6-4e56-b802-8222ee201179" providerId="ADAL" clId="{2FDFBEF1-062A-4120-8290-D6C290D02C2A}" dt="2024-06-03T10:02:27.882" v="1837" actId="20577"/>
+          <ac:chgData name="Weges, Wouter" userId="3777fe71-dce6-4e56-b802-8222ee201179" providerId="ADAL" clId="{2FDFBEF1-062A-4120-8290-D6C290D02C2A}" dt="2024-06-04T08:26:22.174" v="3387" actId="20577"/>
           <ac:spMkLst>
             <pc:docMk/>
             <pc:sldMk cId="4110594355" sldId="295"/>
@@ -702,7 +702,7 @@
           </ac:spMkLst>
         </pc:spChg>
         <pc:spChg chg="mod">
-          <ac:chgData name="Weges, Wouter" userId="3777fe71-dce6-4e56-b802-8222ee201179" providerId="ADAL" clId="{2FDFBEF1-062A-4120-8290-D6C290D02C2A}" dt="2024-06-03T10:03:07.090" v="1863" actId="20577"/>
+          <ac:chgData name="Weges, Wouter" userId="3777fe71-dce6-4e56-b802-8222ee201179" providerId="ADAL" clId="{2FDFBEF1-062A-4120-8290-D6C290D02C2A}" dt="2024-06-04T08:26:34.395" v="3400" actId="20577"/>
           <ac:spMkLst>
             <pc:docMk/>
             <pc:sldMk cId="4110594355" sldId="295"/>
@@ -726,8 +726,8 @@
           </ac:picMkLst>
         </pc:picChg>
       </pc:sldChg>
-      <pc:sldChg chg="addSp modSp add mod">
-        <pc:chgData name="Weges, Wouter" userId="3777fe71-dce6-4e56-b802-8222ee201179" providerId="ADAL" clId="{2FDFBEF1-062A-4120-8290-D6C290D02C2A}" dt="2024-06-03T10:10:00.789" v="2445" actId="22"/>
+      <pc:sldChg chg="addSp delSp modSp add mod">
+        <pc:chgData name="Weges, Wouter" userId="3777fe71-dce6-4e56-b802-8222ee201179" providerId="ADAL" clId="{2FDFBEF1-062A-4120-8290-D6C290D02C2A}" dt="2024-06-04T08:26:43.377" v="3401" actId="478"/>
         <pc:sldMkLst>
           <pc:docMk/>
           <pc:sldMk cId="2467057270" sldId="296"/>
@@ -756,8 +756,8 @@
             <ac:picMk id="5" creationId="{88BF4CF0-08BF-FB09-119B-67050D1895F6}"/>
           </ac:picMkLst>
         </pc:picChg>
-        <pc:picChg chg="add">
-          <ac:chgData name="Weges, Wouter" userId="3777fe71-dce6-4e56-b802-8222ee201179" providerId="ADAL" clId="{2FDFBEF1-062A-4120-8290-D6C290D02C2A}" dt="2024-06-03T10:10:00.789" v="2445" actId="22"/>
+        <pc:picChg chg="add del">
+          <ac:chgData name="Weges, Wouter" userId="3777fe71-dce6-4e56-b802-8222ee201179" providerId="ADAL" clId="{2FDFBEF1-062A-4120-8290-D6C290D02C2A}" dt="2024-06-04T08:26:43.377" v="3401" actId="478"/>
           <ac:picMkLst>
             <pc:docMk/>
             <pc:sldMk cId="2467057270" sldId="296"/>
@@ -828,11 +828,19 @@
         </pc:picChg>
       </pc:sldChg>
       <pc:sldChg chg="addSp delSp modSp add mod">
-        <pc:chgData name="Weges, Wouter" userId="3777fe71-dce6-4e56-b802-8222ee201179" providerId="ADAL" clId="{2FDFBEF1-062A-4120-8290-D6C290D02C2A}" dt="2024-06-03T10:15:30.513" v="2843" actId="115"/>
+        <pc:chgData name="Weges, Wouter" userId="3777fe71-dce6-4e56-b802-8222ee201179" providerId="ADAL" clId="{2FDFBEF1-062A-4120-8290-D6C290D02C2A}" dt="2024-06-04T08:27:06.204" v="3405" actId="20577"/>
         <pc:sldMkLst>
           <pc:docMk/>
           <pc:sldMk cId="4281163654" sldId="299"/>
         </pc:sldMkLst>
+        <pc:spChg chg="mod">
+          <ac:chgData name="Weges, Wouter" userId="3777fe71-dce6-4e56-b802-8222ee201179" providerId="ADAL" clId="{2FDFBEF1-062A-4120-8290-D6C290D02C2A}" dt="2024-06-04T08:27:06.204" v="3405" actId="20577"/>
+          <ac:spMkLst>
+            <pc:docMk/>
+            <pc:sldMk cId="4281163654" sldId="299"/>
+            <ac:spMk id="2" creationId="{E91236BA-96C2-174A-7919-A1157A0F0E98}"/>
+          </ac:spMkLst>
+        </pc:spChg>
         <pc:spChg chg="mod">
           <ac:chgData name="Weges, Wouter" userId="3777fe71-dce6-4e56-b802-8222ee201179" providerId="ADAL" clId="{2FDFBEF1-062A-4120-8290-D6C290D02C2A}" dt="2024-06-03T10:15:30.513" v="2843" actId="115"/>
           <ac:spMkLst>
@@ -867,13 +875,13 @@
         </pc:picChg>
       </pc:sldChg>
       <pc:sldChg chg="addSp delSp modSp add mod">
-        <pc:chgData name="Weges, Wouter" userId="3777fe71-dce6-4e56-b802-8222ee201179" providerId="ADAL" clId="{2FDFBEF1-062A-4120-8290-D6C290D02C2A}" dt="2024-06-03T10:19:36.765" v="2885" actId="1076"/>
+        <pc:chgData name="Weges, Wouter" userId="3777fe71-dce6-4e56-b802-8222ee201179" providerId="ADAL" clId="{2FDFBEF1-062A-4120-8290-D6C290D02C2A}" dt="2024-06-04T08:27:29.215" v="3409" actId="20577"/>
         <pc:sldMkLst>
           <pc:docMk/>
           <pc:sldMk cId="3803310572" sldId="300"/>
         </pc:sldMkLst>
         <pc:spChg chg="mod">
-          <ac:chgData name="Weges, Wouter" userId="3777fe71-dce6-4e56-b802-8222ee201179" providerId="ADAL" clId="{2FDFBEF1-062A-4120-8290-D6C290D02C2A}" dt="2024-06-03T10:18:20.467" v="2875" actId="20577"/>
+          <ac:chgData name="Weges, Wouter" userId="3777fe71-dce6-4e56-b802-8222ee201179" providerId="ADAL" clId="{2FDFBEF1-062A-4120-8290-D6C290D02C2A}" dt="2024-06-04T08:27:29.215" v="3409" actId="20577"/>
           <ac:spMkLst>
             <pc:docMk/>
             <pc:sldMk cId="3803310572" sldId="300"/>
@@ -1077,7 +1085,7 @@
           <a:p>
             <a:fld id="{B6D41BCC-AD73-4203-A5A6-E62EB28B0FE6}" type="datetimeFigureOut">
               <a:rPr lang="en-US" smtClean="0"/>
-              <a:t>6/3/2024</a:t>
+              <a:t>6/4/2024</a:t>
             </a:fld>
             <a:endParaRPr lang="en-US"/>
           </a:p>
@@ -1285,7 +1293,7 @@
           <a:p>
             <a:fld id="{B6D41BCC-AD73-4203-A5A6-E62EB28B0FE6}" type="datetimeFigureOut">
               <a:rPr lang="en-US" smtClean="0"/>
-              <a:t>6/3/2024</a:t>
+              <a:t>6/4/2024</a:t>
             </a:fld>
             <a:endParaRPr lang="en-US"/>
           </a:p>
@@ -1493,7 +1501,7 @@
           <a:p>
             <a:fld id="{B6D41BCC-AD73-4203-A5A6-E62EB28B0FE6}" type="datetimeFigureOut">
               <a:rPr lang="en-US" smtClean="0"/>
-              <a:t>6/3/2024</a:t>
+              <a:t>6/4/2024</a:t>
             </a:fld>
             <a:endParaRPr lang="en-US"/>
           </a:p>
@@ -1691,7 +1699,7 @@
           <a:p>
             <a:fld id="{B6D41BCC-AD73-4203-A5A6-E62EB28B0FE6}" type="datetimeFigureOut">
               <a:rPr lang="en-US" smtClean="0"/>
-              <a:t>6/3/2024</a:t>
+              <a:t>6/4/2024</a:t>
             </a:fld>
             <a:endParaRPr lang="en-US"/>
           </a:p>
@@ -1968,7 +1976,7 @@
           <a:p>
             <a:fld id="{B6D41BCC-AD73-4203-A5A6-E62EB28B0FE6}" type="datetimeFigureOut">
               <a:rPr lang="en-US" smtClean="0"/>
-              <a:t>6/3/2024</a:t>
+              <a:t>6/4/2024</a:t>
             </a:fld>
             <a:endParaRPr lang="en-US"/>
           </a:p>
@@ -2238,7 +2246,7 @@
           <a:p>
             <a:fld id="{B6D41BCC-AD73-4203-A5A6-E62EB28B0FE6}" type="datetimeFigureOut">
               <a:rPr lang="en-US" smtClean="0"/>
-              <a:t>6/3/2024</a:t>
+              <a:t>6/4/2024</a:t>
             </a:fld>
             <a:endParaRPr lang="en-US"/>
           </a:p>
@@ -2654,7 +2662,7 @@
           <a:p>
             <a:fld id="{B6D41BCC-AD73-4203-A5A6-E62EB28B0FE6}" type="datetimeFigureOut">
               <a:rPr lang="en-US" smtClean="0"/>
-              <a:t>6/3/2024</a:t>
+              <a:t>6/4/2024</a:t>
             </a:fld>
             <a:endParaRPr lang="en-US"/>
           </a:p>
@@ -2795,7 +2803,7 @@
           <a:p>
             <a:fld id="{B6D41BCC-AD73-4203-A5A6-E62EB28B0FE6}" type="datetimeFigureOut">
               <a:rPr lang="en-US" smtClean="0"/>
-              <a:t>6/3/2024</a:t>
+              <a:t>6/4/2024</a:t>
             </a:fld>
             <a:endParaRPr lang="en-US"/>
           </a:p>
@@ -2908,7 +2916,7 @@
           <a:p>
             <a:fld id="{B6D41BCC-AD73-4203-A5A6-E62EB28B0FE6}" type="datetimeFigureOut">
               <a:rPr lang="en-US" smtClean="0"/>
-              <a:t>6/3/2024</a:t>
+              <a:t>6/4/2024</a:t>
             </a:fld>
             <a:endParaRPr lang="en-US"/>
           </a:p>
@@ -3234,7 +3242,7 @@
           <a:p>
             <a:fld id="{B6D41BCC-AD73-4203-A5A6-E62EB28B0FE6}" type="datetimeFigureOut">
               <a:rPr lang="en-US" smtClean="0"/>
-              <a:t>6/3/2024</a:t>
+              <a:t>6/4/2024</a:t>
             </a:fld>
             <a:endParaRPr lang="en-US"/>
           </a:p>
@@ -3522,7 +3530,7 @@
           <a:p>
             <a:fld id="{B6D41BCC-AD73-4203-A5A6-E62EB28B0FE6}" type="datetimeFigureOut">
               <a:rPr lang="en-US" smtClean="0"/>
-              <a:t>6/3/2024</a:t>
+              <a:t>6/4/2024</a:t>
             </a:fld>
             <a:endParaRPr lang="en-US"/>
           </a:p>
@@ -3762,7 +3770,7 @@
             <a:fld id="{B6D41BCC-AD73-4203-A5A6-E62EB28B0FE6}" type="datetimeFigureOut">
               <a:rPr lang="en-US" smtClean="0"/>
               <a:pPr/>
-              <a:t>6/3/2024</a:t>
+              <a:t>6/4/2024</a:t>
             </a:fld>
             <a:endParaRPr lang="en-US"/>
           </a:p>
@@ -5397,7 +5405,7 @@
             </a:r>
             <a:r>
               <a:rPr lang="en-US" dirty="0" err="1"/>
-              <a:t>displayen</a:t>
+              <a:t>weergeven</a:t>
             </a:r>
             <a:r>
               <a:rPr lang="en-US" dirty="0"/>
@@ -5438,7 +5446,7 @@
             </a:r>
             <a:r>
               <a:rPr lang="en-US" dirty="0" err="1"/>
-              <a:t>gedisplayed</a:t>
+              <a:t>weergegeven</a:t>
             </a:r>
             <a:endParaRPr lang="en-US" dirty="0"/>
           </a:p>
@@ -6011,36 +6019,6 @@
           </a:prstGeom>
         </p:spPr>
       </p:pic>
-      <p:pic>
-        <p:nvPicPr>
-          <p:cNvPr id="7" name="Picture 6">
-            <a:extLst>
-              <a:ext uri="{FF2B5EF4-FFF2-40B4-BE49-F238E27FC236}">
-                <a16:creationId xmlns:a16="http://schemas.microsoft.com/office/drawing/2014/main" id="{F769FAFB-F83D-0761-DA4D-36FD4F761086}"/>
-              </a:ext>
-            </a:extLst>
-          </p:cNvPr>
-          <p:cNvPicPr>
-            <a:picLocks noChangeAspect="1"/>
-          </p:cNvPicPr>
-          <p:nvPr/>
-        </p:nvPicPr>
-        <p:blipFill>
-          <a:blip r:embed="rId3"/>
-          <a:stretch>
-            <a:fillRect/>
-          </a:stretch>
-        </p:blipFill>
-        <p:spPr>
-          <a:xfrm>
-            <a:off x="4638471" y="2576393"/>
-            <a:ext cx="2915057" cy="1705213"/>
-          </a:xfrm>
-          <a:prstGeom prst="rect">
-            <a:avLst/>
-          </a:prstGeom>
-        </p:spPr>
-      </p:pic>
     </p:spTree>
     <p:extLst>
       <p:ext uri="{BB962C8B-B14F-4D97-AF65-F5344CB8AC3E}">
@@ -6259,7 +6237,7 @@
           <a:p>
             <a:r>
               <a:rPr lang="en-US" dirty="0"/>
-              <a:t>GET request </a:t>
+              <a:t>POST request </a:t>
             </a:r>
             <a:r>
               <a:rPr lang="en-US" dirty="0" err="1"/>
@@ -6631,7 +6609,7 @@
           <a:p>
             <a:r>
               <a:rPr lang="en-US" dirty="0"/>
-              <a:t>GET request </a:t>
+              <a:t>POST request </a:t>
             </a:r>
             <a:r>
               <a:rPr lang="en-US" dirty="0" err="1"/>
@@ -8037,7 +8015,7 @@
             <a:pPr lvl="1"/>
             <a:r>
               <a:rPr lang="en-US" dirty="0" err="1"/>
-              <a:t>Commiten</a:t>
+              <a:t>Committen</a:t>
             </a:r>
             <a:r>
               <a:rPr lang="en-US" dirty="0"/>

</xml_diff>